<commit_message>
Working on sessions 1 and 2
</commit_message>
<xml_diff>
--- a/lbl2016/HPX Workshop (Berkeley C++ Summit) - 1.pptx
+++ b/lbl2016/HPX Workshop (Berkeley C++ Summit) - 1.pptx
@@ -5,7 +5,7 @@
     <p:sldMasterId id="2147483660" r:id="rId1"/>
   </p:sldMasterIdLst>
   <p:notesMasterIdLst>
-    <p:notesMasterId r:id="rId36"/>
+    <p:notesMasterId r:id="rId37"/>
   </p:notesMasterIdLst>
   <p:sldIdLst>
     <p:sldId id="256" r:id="rId2"/>
@@ -41,7 +41,8 @@
     <p:sldId id="367" r:id="rId32"/>
     <p:sldId id="368" r:id="rId33"/>
     <p:sldId id="369" r:id="rId34"/>
-    <p:sldId id="359" r:id="rId35"/>
+    <p:sldId id="371" r:id="rId35"/>
+    <p:sldId id="359" r:id="rId36"/>
   </p:sldIdLst>
   <p:sldSz cx="12192000" cy="6858000"/>
   <p:notesSz cx="6858000" cy="9144000"/>
@@ -792,11 +793,11 @@
           <c:showPercent val="0"/>
           <c:showBubbleSize val="0"/>
         </c:dLbls>
-        <c:axId val="759340216"/>
-        <c:axId val="759338256"/>
+        <c:axId val="718582568"/>
+        <c:axId val="718588840"/>
       </c:scatterChart>
       <c:valAx>
-        <c:axId val="759340216"/>
+        <c:axId val="718582568"/>
         <c:scaling>
           <c:orientation val="minMax"/>
           <c:max val="20"/>
@@ -909,12 +910,12 @@
             <a:endParaRPr lang="en-US"/>
           </a:p>
         </c:txPr>
-        <c:crossAx val="759338256"/>
+        <c:crossAx val="718588840"/>
         <c:crosses val="autoZero"/>
         <c:crossBetween val="midCat"/>
       </c:valAx>
       <c:valAx>
-        <c:axId val="759338256"/>
+        <c:axId val="718588840"/>
         <c:scaling>
           <c:orientation val="minMax"/>
         </c:scaling>
@@ -1043,7 +1044,7 @@
             <a:endParaRPr lang="en-US"/>
           </a:p>
         </c:txPr>
-        <c:crossAx val="759340216"/>
+        <c:crossAx val="718582568"/>
         <c:crosses val="autoZero"/>
         <c:crossBetween val="midCat"/>
         <c:dispUnits>
@@ -2817,7 +2818,7 @@
           <a:p>
             <a:fld id="{9895210F-3153-47D6-B786-4D5C9DCDB62B}" type="slidenum">
               <a:rPr lang="en-US" smtClean="0"/>
-              <a:t>34</a:t>
+              <a:t>35</a:t>
             </a:fld>
             <a:endParaRPr lang="en-US"/>
           </a:p>
@@ -3053,7 +3054,7 @@
           <a:p>
             <a:r>
               <a:rPr lang="en-US" smtClean="0"/>
-              <a:t>HPX - The C++ Standards Library for Concurrency and Parallelism (http://stellar-group.org/hpx)</a:t>
+              <a:t>HPX Workshop (Berkeley C++ Summit) - 1,            Hartmut Kaiser (hkaiser@cct.lsu.edu)</a:t>
             </a:r>
             <a:endParaRPr lang="en-US"/>
           </a:p>
@@ -3234,7 +3235,7 @@
           <a:p>
             <a:r>
               <a:rPr lang="en-US" smtClean="0"/>
-              <a:t>HPX - The C++ Standards Library for Concurrency and Parallelism (http://stellar-group.org/hpx)</a:t>
+              <a:t>HPX Workshop (Berkeley C++ Summit) - 1,            Hartmut Kaiser (hkaiser@cct.lsu.edu)</a:t>
             </a:r>
             <a:endParaRPr lang="en-US"/>
           </a:p>
@@ -3459,7 +3460,7 @@
           <a:p>
             <a:r>
               <a:rPr lang="en-US" smtClean="0"/>
-              <a:t>HPX - The C++ Standards Library for Concurrency and Parallelism (http://stellar-group.org/hpx)</a:t>
+              <a:t>HPX Workshop (Berkeley C++ Summit) - 1,            Hartmut Kaiser (hkaiser@cct.lsu.edu)</a:t>
             </a:r>
             <a:endParaRPr lang="en-US"/>
           </a:p>
@@ -3674,7 +3675,7 @@
           <a:p>
             <a:r>
               <a:rPr lang="en-US" smtClean="0"/>
-              <a:t>HPX - The C++ Standards Library for Concurrency and Parallelism (http://stellar-group.org/hpx)</a:t>
+              <a:t>HPX Workshop (Berkeley C++ Summit) - 1,            Hartmut Kaiser (hkaiser@cct.lsu.edu)</a:t>
             </a:r>
             <a:endParaRPr lang="en-US"/>
           </a:p>
@@ -4010,7 +4011,7 @@
           <a:p>
             <a:r>
               <a:rPr lang="en-US" smtClean="0"/>
-              <a:t>HPX - The C++ Standards Library for Concurrency and Parallelism (http://stellar-group.org/hpx)</a:t>
+              <a:t>HPX Workshop (Berkeley C++ Summit) - 1,            Hartmut Kaiser (hkaiser@cct.lsu.edu)</a:t>
             </a:r>
             <a:endParaRPr lang="en-US"/>
           </a:p>
@@ -4343,7 +4344,7 @@
           <a:p>
             <a:r>
               <a:rPr lang="en-US" smtClean="0"/>
-              <a:t>HPX - The C++ Standards Library for Concurrency and Parallelism (http://stellar-group.org/hpx)</a:t>
+              <a:t>HPX Workshop (Berkeley C++ Summit) - 1,            Hartmut Kaiser (hkaiser@cct.lsu.edu)</a:t>
             </a:r>
             <a:endParaRPr lang="en-US"/>
           </a:p>
@@ -4876,7 +4877,7 @@
           <a:p>
             <a:r>
               <a:rPr lang="en-US" smtClean="0"/>
-              <a:t>HPX - The C++ Standards Library for Concurrency and Parallelism (http://stellar-group.org/hpx)</a:t>
+              <a:t>HPX Workshop (Berkeley C++ Summit) - 1,            Hartmut Kaiser (hkaiser@cct.lsu.edu)</a:t>
             </a:r>
             <a:endParaRPr lang="en-US"/>
           </a:p>
@@ -5076,7 +5077,7 @@
           <a:p>
             <a:r>
               <a:rPr lang="en-US" smtClean="0"/>
-              <a:t>HPX - The C++ Standards Library for Concurrency and Parallelism (http://stellar-group.org/hpx)</a:t>
+              <a:t>HPX Workshop (Berkeley C++ Summit) - 1,            Hartmut Kaiser (hkaiser@cct.lsu.edu)</a:t>
             </a:r>
             <a:endParaRPr lang="en-US"/>
           </a:p>
@@ -5253,7 +5254,7 @@
           <a:p>
             <a:r>
               <a:rPr lang="en-US" smtClean="0"/>
-              <a:t>HPX - The C++ Standards Library for Concurrency and Parallelism (http://stellar-group.org/hpx)</a:t>
+              <a:t>HPX Workshop (Berkeley C++ Summit) - 1,            Hartmut Kaiser (hkaiser@cct.lsu.edu)</a:t>
             </a:r>
             <a:endParaRPr lang="en-US"/>
           </a:p>
@@ -5585,7 +5586,7 @@
           <a:p>
             <a:r>
               <a:rPr lang="en-US" smtClean="0"/>
-              <a:t>HPX - The C++ Standards Library for Concurrency and Parallelism (http://stellar-group.org/hpx)</a:t>
+              <a:t>HPX Workshop (Berkeley C++ Summit) - 1,            Hartmut Kaiser (hkaiser@cct.lsu.edu)</a:t>
             </a:r>
             <a:endParaRPr lang="en-US"/>
           </a:p>
@@ -5904,7 +5905,7 @@
           <a:p>
             <a:r>
               <a:rPr lang="en-US" smtClean="0"/>
-              <a:t>HPX - The C++ Standards Library for Concurrency and Parallelism (http://stellar-group.org/hpx)</a:t>
+              <a:t>HPX Workshop (Berkeley C++ Summit) - 1,            Hartmut Kaiser (hkaiser@cct.lsu.edu)</a:t>
             </a:r>
             <a:endParaRPr lang="en-US"/>
           </a:p>
@@ -6179,7 +6180,7 @@
           <a:p>
             <a:r>
               <a:rPr lang="en-US" smtClean="0"/>
-              <a:t>HPX - The C++ Standards Library for Concurrency and Parallelism (http://stellar-group.org/hpx)</a:t>
+              <a:t>HPX Workshop (Berkeley C++ Summit) - 1,            Hartmut Kaiser (hkaiser@cct.lsu.edu)</a:t>
             </a:r>
             <a:endParaRPr lang="en-US"/>
           </a:p>
@@ -6651,11 +6652,7 @@
           <a:p>
             <a:r>
               <a:rPr lang="en-US" dirty="0" smtClean="0"/>
-              <a:t>HPX </a:t>
-            </a:r>
-            <a:r>
-              <a:rPr lang="en-US" dirty="0" smtClean="0"/>
-              <a:t>Workshop (1)</a:t>
+              <a:t>HPX Workshop (1)</a:t>
             </a:r>
             <a:endParaRPr lang="en-US" dirty="0"/>
           </a:p>
@@ -6678,7 +6675,24 @@
           <a:p>
             <a:r>
               <a:rPr lang="en-US" dirty="0" smtClean="0"/>
-              <a:t>Berkeley C++ Summit 2016</a:t>
+              <a:t>Introduction, Architecture, </a:t>
+            </a:r>
+            <a:r>
+              <a:rPr lang="en-US" smtClean="0"/>
+              <a:t>Hello World</a:t>
+            </a:r>
+          </a:p>
+          <a:p>
+            <a:endParaRPr lang="en-US" smtClean="0"/>
+          </a:p>
+          <a:p>
+            <a:r>
+              <a:rPr lang="en-US" dirty="0" smtClean="0"/>
+              <a:t>Berkeley </a:t>
+            </a:r>
+            <a:r>
+              <a:rPr lang="en-US" dirty="0" smtClean="0"/>
+              <a:t>C++ Summit 2016</a:t>
             </a:r>
             <a:endParaRPr lang="en-US" dirty="0"/>
           </a:p>
@@ -6886,7 +6900,7 @@
           <a:p>
             <a:r>
               <a:rPr lang="en-US" smtClean="0"/>
-              <a:t>HPX - The C++ Standards Library for Concurrency and Parallelism (http://stellar-group.org/hpx)</a:t>
+              <a:t>HPX Workshop (Berkeley C++ Summit) - 1,            Hartmut Kaiser (hkaiser@cct.lsu.edu)</a:t>
             </a:r>
             <a:endParaRPr lang="en-US"/>
           </a:p>
@@ -7134,7 +7148,7 @@
           <a:p>
             <a:r>
               <a:rPr lang="en-US" smtClean="0"/>
-              <a:t>HPX - The C++ Standards Library for Concurrency and Parallelism (http://stellar-group.org/hpx)</a:t>
+              <a:t>HPX Workshop (Berkeley C++ Summit) - 1,            Hartmut Kaiser (hkaiser@cct.lsu.edu)</a:t>
             </a:r>
             <a:endParaRPr lang="en-US"/>
           </a:p>
@@ -7295,7 +7309,7 @@
           <a:p>
             <a:r>
               <a:rPr lang="en-US" smtClean="0"/>
-              <a:t>HPX - The C++ Standards Library for Concurrency and Parallelism (http://stellar-group.org/hpx)</a:t>
+              <a:t>HPX Workshop (Berkeley C++ Summit) - 1,            Hartmut Kaiser (hkaiser@cct.lsu.edu)</a:t>
             </a:r>
             <a:endParaRPr lang="en-US"/>
           </a:p>
@@ -7419,7 +7433,7 @@
           <a:p>
             <a:r>
               <a:rPr lang="en-US" smtClean="0"/>
-              <a:t>HPX - The C++ Standards Library for Concurrency and Parallelism (http://stellar-group.org/hpx)</a:t>
+              <a:t>HPX Workshop (Berkeley C++ Summit) - 1,            Hartmut Kaiser (hkaiser@cct.lsu.edu)</a:t>
             </a:r>
             <a:endParaRPr lang="en-US" dirty="0"/>
           </a:p>
@@ -7697,7 +7711,7 @@
           <a:p>
             <a:r>
               <a:rPr lang="en-US" smtClean="0"/>
-              <a:t>HPX - The C++ Standards Library for Concurrency and Parallelism (http://stellar-group.org/hpx)</a:t>
+              <a:t>HPX Workshop (Berkeley C++ Summit) - 1,            Hartmut Kaiser (hkaiser@cct.lsu.edu)</a:t>
             </a:r>
             <a:endParaRPr lang="en-US"/>
           </a:p>
@@ -7945,7 +7959,7 @@
           <a:p>
             <a:r>
               <a:rPr lang="en-US" smtClean="0"/>
-              <a:t>HPX - The C++ Standards Library for Concurrency and Parallelism (http://stellar-group.org/hpx)</a:t>
+              <a:t>HPX Workshop (Berkeley C++ Summit) - 1,            Hartmut Kaiser (hkaiser@cct.lsu.edu)</a:t>
             </a:r>
             <a:endParaRPr lang="en-US"/>
           </a:p>
@@ -8299,7 +8313,7 @@
           <a:p>
             <a:r>
               <a:rPr lang="en-US" smtClean="0"/>
-              <a:t>HPX - The C++ Standards Library for Concurrency and Parallelism (http://stellar-group.org/hpx)</a:t>
+              <a:t>HPX Workshop (Berkeley C++ Summit) - 1,            Hartmut Kaiser (hkaiser@cct.lsu.edu)</a:t>
             </a:r>
             <a:endParaRPr lang="en-US"/>
           </a:p>
@@ -8524,7 +8538,7 @@
           <a:p>
             <a:r>
               <a:rPr lang="en-US" smtClean="0"/>
-              <a:t>HPX - The C++ Standards Library for Concurrency and Parallelism (http://stellar-group.org/hpx)</a:t>
+              <a:t>HPX Workshop (Berkeley C++ Summit) - 1,            Hartmut Kaiser (hkaiser@cct.lsu.edu)</a:t>
             </a:r>
             <a:endParaRPr lang="en-US"/>
           </a:p>
@@ -8746,7 +8760,7 @@
           <a:p>
             <a:r>
               <a:rPr lang="en-US" smtClean="0"/>
-              <a:t>HPX - The C++ Standards Library for Concurrency and Parallelism (http://stellar-group.org/hpx)</a:t>
+              <a:t>HPX Workshop (Berkeley C++ Summit) - 1,            Hartmut Kaiser (hkaiser@cct.lsu.edu)</a:t>
             </a:r>
             <a:endParaRPr lang="en-US"/>
           </a:p>
@@ -9064,7 +9078,7 @@
           <a:p>
             <a:r>
               <a:rPr lang="en-US" smtClean="0"/>
-              <a:t>HPX - The C++ Standards Library for Concurrency and Parallelism (http://stellar-group.org/hpx)</a:t>
+              <a:t>HPX Workshop (Berkeley C++ Summit) - 1,            Hartmut Kaiser (hkaiser@cct.lsu.edu)</a:t>
             </a:r>
             <a:endParaRPr lang="en-US"/>
           </a:p>
@@ -9220,8 +9234,11 @@
                   </a:schemeClr>
                 </a:solidFill>
               </a:rPr>
-              <a:t>The </a:t>
-            </a:r>
+              <a:t>The API of HPX</a:t>
+            </a:r>
+          </a:p>
+          <a:p>
+            <a:pPr lvl="1"/>
             <a:r>
               <a:rPr lang="en-US" dirty="0" smtClean="0">
                 <a:solidFill>
@@ -9230,34 +9247,34 @@
                   </a:schemeClr>
                 </a:solidFill>
               </a:rPr>
-              <a:t>API of HPX</a:t>
+              <a:t>Futures, etc.</a:t>
             </a:r>
           </a:p>
           <a:p>
             <a:pPr lvl="1"/>
             <a:r>
-              <a:rPr lang="en-US" dirty="0" smtClean="0">
+              <a:rPr lang="en-US" dirty="0" err="1" smtClean="0">
                 <a:solidFill>
                   <a:schemeClr val="bg2">
                     <a:lumMod val="50000"/>
                   </a:schemeClr>
                 </a:solidFill>
               </a:rPr>
-              <a:t>Futures, etc.</a:t>
-            </a:r>
-          </a:p>
-          <a:p>
-            <a:pPr lvl="1"/>
-            <a:r>
-              <a:rPr lang="en-US" dirty="0" err="1" smtClean="0">
+              <a:t>Async</a:t>
+            </a:r>
+            <a:r>
+              <a:rPr lang="en-US" dirty="0" smtClean="0">
                 <a:solidFill>
                   <a:schemeClr val="bg2">
                     <a:lumMod val="50000"/>
                   </a:schemeClr>
                 </a:solidFill>
               </a:rPr>
-              <a:t>Async</a:t>
-            </a:r>
+              <a:t>, etc.</a:t>
+            </a:r>
+          </a:p>
+          <a:p>
+            <a:pPr lvl="1"/>
             <a:r>
               <a:rPr lang="en-US" dirty="0" smtClean="0">
                 <a:solidFill>
@@ -9266,11 +9283,11 @@
                   </a:schemeClr>
                 </a:solidFill>
               </a:rPr>
-              <a:t>, etc.</a:t>
-            </a:r>
-          </a:p>
-          <a:p>
-            <a:pPr lvl="1"/>
+              <a:t>Higher level parallel constructs</a:t>
+            </a:r>
+          </a:p>
+          <a:p>
+            <a:pPr lvl="2"/>
             <a:r>
               <a:rPr lang="en-US" dirty="0" smtClean="0">
                 <a:solidFill>
@@ -9279,11 +9296,10 @@
                   </a:schemeClr>
                 </a:solidFill>
               </a:rPr>
-              <a:t>Higher level parallel constructs</a:t>
-            </a:r>
-          </a:p>
-          <a:p>
-            <a:pPr lvl="2"/>
+              <a:t>Execution policies, executors, parameters, targets</a:t>
+            </a:r>
+          </a:p>
+          <a:p>
             <a:r>
               <a:rPr lang="en-US" dirty="0" smtClean="0">
                 <a:solidFill>
@@ -9292,10 +9308,11 @@
                   </a:schemeClr>
                 </a:solidFill>
               </a:rPr>
-              <a:t>Execution policies, executors, parameters, targets</a:t>
-            </a:r>
-          </a:p>
-          <a:p>
+              <a:t>Real world problems</a:t>
+            </a:r>
+          </a:p>
+          <a:p>
+            <a:pPr lvl="1"/>
             <a:r>
               <a:rPr lang="en-US" dirty="0" smtClean="0">
                 <a:solidFill>
@@ -9304,8 +9321,11 @@
                   </a:schemeClr>
                 </a:solidFill>
               </a:rPr>
-              <a:t>Real </a:t>
-            </a:r>
+              <a:t>Fibonacci (parallelism for recursive algorithms)</a:t>
+            </a:r>
+          </a:p>
+          <a:p>
+            <a:pPr lvl="1"/>
             <a:r>
               <a:rPr lang="en-US" dirty="0" smtClean="0">
                 <a:solidFill>
@@ -9314,7 +9334,7 @@
                   </a:schemeClr>
                 </a:solidFill>
               </a:rPr>
-              <a:t>world problems</a:t>
+              <a:t>2d stencil (parallelism for iterative algorithms)</a:t>
             </a:r>
           </a:p>
           <a:p>
@@ -9327,32 +9347,6 @@
                   </a:schemeClr>
                 </a:solidFill>
               </a:rPr>
-              <a:t>Fibonacci (parallelism for recursive algorithms)</a:t>
-            </a:r>
-          </a:p>
-          <a:p>
-            <a:pPr lvl="1"/>
-            <a:r>
-              <a:rPr lang="en-US" dirty="0" smtClean="0">
-                <a:solidFill>
-                  <a:schemeClr val="bg2">
-                    <a:lumMod val="50000"/>
-                  </a:schemeClr>
-                </a:solidFill>
-              </a:rPr>
-              <a:t>2d stencil (parallelism for iterative algorithms)</a:t>
-            </a:r>
-          </a:p>
-          <a:p>
-            <a:pPr lvl="1"/>
-            <a:r>
-              <a:rPr lang="en-US" dirty="0" smtClean="0">
-                <a:solidFill>
-                  <a:schemeClr val="bg2">
-                    <a:lumMod val="50000"/>
-                  </a:schemeClr>
-                </a:solidFill>
-              </a:rPr>
               <a:t>Matrix transpose (parallelism for fork-join algorithms)</a:t>
             </a:r>
           </a:p>
@@ -9398,7 +9392,7 @@
           <a:p>
             <a:r>
               <a:rPr lang="en-US" smtClean="0"/>
-              <a:t>HPX - The C++ Standards Library for Concurrency and Parallelism (http://stellar-group.org/hpx)</a:t>
+              <a:t>HPX Workshop (Berkeley C++ Summit) - 1,            Hartmut Kaiser (hkaiser@cct.lsu.edu)</a:t>
             </a:r>
             <a:endParaRPr lang="en-US"/>
           </a:p>
@@ -9635,7 +9629,7 @@
           <a:p>
             <a:r>
               <a:rPr lang="en-US" smtClean="0"/>
-              <a:t>HPX - The C++ Standards Library for Concurrency and Parallelism (http://stellar-group.org/hpx)</a:t>
+              <a:t>HPX Workshop (Berkeley C++ Summit) - 1,            Hartmut Kaiser (hkaiser@cct.lsu.edu)</a:t>
             </a:r>
             <a:endParaRPr lang="en-US"/>
           </a:p>
@@ -9986,7 +9980,7 @@
           <a:p>
             <a:r>
               <a:rPr lang="en-US" smtClean="0"/>
-              <a:t>HPX - The C++ Standards Library for Concurrency and Parallelism (http://stellar-group.org/hpx)</a:t>
+              <a:t>HPX Workshop (Berkeley C++ Summit) - 1,            Hartmut Kaiser (hkaiser@cct.lsu.edu)</a:t>
             </a:r>
             <a:endParaRPr lang="en-US"/>
           </a:p>
@@ -10292,7 +10286,7 @@
           <a:p>
             <a:r>
               <a:rPr lang="en-US" smtClean="0"/>
-              <a:t>HPX - The C++ Standards Library for Concurrency and Parallelism (http://stellar-group.org/hpx)</a:t>
+              <a:t>HPX Workshop (Berkeley C++ Summit) - 1,            Hartmut Kaiser (hkaiser@cct.lsu.edu)</a:t>
             </a:r>
             <a:endParaRPr lang="en-US"/>
           </a:p>
@@ -10524,7 +10518,7 @@
           <a:p>
             <a:r>
               <a:rPr lang="en-US" smtClean="0"/>
-              <a:t>HPX - The C++ Standards Library for Concurrency and Parallelism (http://stellar-group.org/hpx)</a:t>
+              <a:t>HPX Workshop (Berkeley C++ Summit) - 1,            Hartmut Kaiser (hkaiser@cct.lsu.edu)</a:t>
             </a:r>
             <a:endParaRPr lang="en-US"/>
           </a:p>
@@ -10822,7 +10816,7 @@
           <a:p>
             <a:r>
               <a:rPr lang="en-US" smtClean="0"/>
-              <a:t>HPX - The C++ Standards Library for Concurrency and Parallelism (http://stellar-group.org/hpx)</a:t>
+              <a:t>HPX Workshop (Berkeley C++ Summit) - 1,            Hartmut Kaiser (hkaiser@cct.lsu.edu)</a:t>
             </a:r>
             <a:endParaRPr lang="en-US"/>
           </a:p>
@@ -11633,7 +11627,7 @@
           <a:p>
             <a:r>
               <a:rPr lang="en-US" smtClean="0"/>
-              <a:t>HPX - The C++ Standards Library for Concurrency and Parallelism (http://stellar-group.org/hpx)</a:t>
+              <a:t>HPX Workshop (Berkeley C++ Summit) - 1,            Hartmut Kaiser (hkaiser@cct.lsu.edu)</a:t>
             </a:r>
             <a:endParaRPr lang="en-US"/>
           </a:p>
@@ -11780,7 +11774,7 @@
           <a:p>
             <a:r>
               <a:rPr lang="en-US" smtClean="0"/>
-              <a:t>HPX - The C++ Standards Library for Concurrency and Parallelism (http://stellar-group.org/hpx)</a:t>
+              <a:t>HPX Workshop (Berkeley C++ Summit) - 1,            Hartmut Kaiser (hkaiser@cct.lsu.edu)</a:t>
             </a:r>
             <a:endParaRPr lang="en-US" dirty="0"/>
           </a:p>
@@ -12970,7 +12964,7 @@
           <a:p>
             <a:r>
               <a:rPr lang="en-US" smtClean="0"/>
-              <a:t>HPX - The C++ Standards Library for Concurrency and Parallelism (http://stellar-group.org/hpx)</a:t>
+              <a:t>HPX Workshop (Berkeley C++ Summit) - 1,            Hartmut Kaiser (hkaiser@cct.lsu.edu)</a:t>
             </a:r>
             <a:endParaRPr lang="en-US" dirty="0"/>
           </a:p>
@@ -13892,7 +13886,7 @@
           <a:p>
             <a:r>
               <a:rPr lang="en-US" smtClean="0"/>
-              <a:t>HPX - The C++ Standards Library for Concurrency and Parallelism (http://stellar-group.org/hpx)</a:t>
+              <a:t>HPX Workshop (Berkeley C++ Summit) - 1,            Hartmut Kaiser (hkaiser@cct.lsu.edu)</a:t>
             </a:r>
             <a:endParaRPr lang="en-US" dirty="0"/>
           </a:p>
@@ -14348,7 +14342,7 @@
           <a:p>
             <a:r>
               <a:rPr lang="en-US" smtClean="0"/>
-              <a:t>HPX - The C++ Standards Library for Concurrency and Parallelism (http://stellar-group.org/hpx)</a:t>
+              <a:t>HPX Workshop (Berkeley C++ Summit) - 1,            Hartmut Kaiser (hkaiser@cct.lsu.edu)</a:t>
             </a:r>
             <a:endParaRPr lang="en-US"/>
           </a:p>
@@ -14501,7 +14495,7 @@
           <a:p>
             <a:r>
               <a:rPr lang="en-US" smtClean="0"/>
-              <a:t>HPX - The C++ Standards Library for Concurrency and Parallelism (http://stellar-group.org/hpx)</a:t>
+              <a:t>HPX Workshop (Berkeley C++ Summit) - 1,            Hartmut Kaiser (hkaiser@cct.lsu.edu)</a:t>
             </a:r>
             <a:endParaRPr lang="en-US"/>
           </a:p>
@@ -14852,7 +14846,7 @@
           <a:p>
             <a:r>
               <a:rPr lang="en-US" smtClean="0"/>
-              <a:t>HPX - The C++ Standards Library for Concurrency and Parallelism (http://stellar-group.org/hpx)</a:t>
+              <a:t>HPX Workshop (Berkeley C++ Summit) - 1,            Hartmut Kaiser (hkaiser@cct.lsu.edu)</a:t>
             </a:r>
             <a:endParaRPr lang="en-US"/>
           </a:p>
@@ -16046,7 +16040,7 @@
           <a:p>
             <a:r>
               <a:rPr lang="en-US" smtClean="0"/>
-              <a:t>HPX - The C++ Standards Library for Concurrency and Parallelism (http://stellar-group.org/hpx)</a:t>
+              <a:t>HPX Workshop (Berkeley C++ Summit) - 1,            Hartmut Kaiser (hkaiser@cct.lsu.edu)</a:t>
             </a:r>
             <a:endParaRPr lang="en-US" dirty="0"/>
           </a:p>
@@ -16444,7 +16438,7 @@
           <a:p>
             <a:r>
               <a:rPr lang="en-US" smtClean="0"/>
-              <a:t>HPX - The C++ Standards Library for Concurrency and Parallelism (http://stellar-group.org/hpx)</a:t>
+              <a:t>HPX Workshop (Berkeley C++ Summit) - 1,            Hartmut Kaiser (hkaiser@cct.lsu.edu)</a:t>
             </a:r>
             <a:endParaRPr lang="en-US"/>
           </a:p>
@@ -17670,7 +17664,7 @@
           <a:p>
             <a:r>
               <a:rPr lang="en-US" smtClean="0"/>
-              <a:t>HPX - The C++ Standards Library for Concurrency and Parallelism (http://stellar-group.org/hpx)</a:t>
+              <a:t>HPX Workshop (Berkeley C++ Summit) - 1,            Hartmut Kaiser (hkaiser@cct.lsu.edu)</a:t>
             </a:r>
             <a:endParaRPr lang="en-US" dirty="0"/>
           </a:p>
@@ -17705,6 +17699,179 @@
 </file>
 
 <file path=ppt/slides/slide34.xml><?xml version="1.0" encoding="utf-8"?>
+<p:sld xmlns:a="http://schemas.openxmlformats.org/drawingml/2006/main" xmlns:r="http://schemas.openxmlformats.org/officeDocument/2006/relationships" xmlns:p="http://schemas.openxmlformats.org/presentationml/2006/main">
+  <p:cSld>
+    <p:spTree>
+      <p:nvGrpSpPr>
+        <p:cNvPr id="1" name=""/>
+        <p:cNvGrpSpPr/>
+        <p:nvPr/>
+      </p:nvGrpSpPr>
+      <p:grpSpPr>
+        <a:xfrm>
+          <a:off x="0" y="0"/>
+          <a:ext cx="0" cy="0"/>
+          <a:chOff x="0" y="0"/>
+          <a:chExt cx="0" cy="0"/>
+        </a:xfrm>
+      </p:grpSpPr>
+      <p:sp>
+        <p:nvSpPr>
+          <p:cNvPr id="2" name="Title 1"/>
+          <p:cNvSpPr>
+            <a:spLocks noGrp="1"/>
+          </p:cNvSpPr>
+          <p:nvPr>
+            <p:ph type="title"/>
+          </p:nvPr>
+        </p:nvSpPr>
+        <p:spPr/>
+        <p:txBody>
+          <a:bodyPr/>
+          <a:lstStyle/>
+          <a:p>
+            <a:r>
+              <a:rPr lang="en-US" dirty="0"/>
+              <a:t>Hello Distributed HPX World</a:t>
+            </a:r>
+          </a:p>
+        </p:txBody>
+      </p:sp>
+      <p:sp>
+        <p:nvSpPr>
+          <p:cNvPr id="3" name="Content Placeholder 2"/>
+          <p:cNvSpPr>
+            <a:spLocks noGrp="1"/>
+          </p:cNvSpPr>
+          <p:nvPr>
+            <p:ph idx="1"/>
+          </p:nvPr>
+        </p:nvSpPr>
+        <p:spPr>
+          <a:xfrm>
+            <a:off x="1261872" y="1828800"/>
+            <a:ext cx="9692640" cy="4351337"/>
+          </a:xfrm>
+        </p:spPr>
+        <p:txBody>
+          <a:bodyPr/>
+          <a:lstStyle/>
+          <a:p>
+            <a:r>
+              <a:rPr lang="en-US" dirty="0" smtClean="0"/>
+              <a:t>Full example code see </a:t>
+            </a:r>
+            <a:r>
+              <a:rPr lang="en-US" dirty="0">
+                <a:hlinkClick r:id="rId2"/>
+              </a:rPr>
+              <a:t>https://</a:t>
+            </a:r>
+            <a:r>
+              <a:rPr lang="en-US" dirty="0" smtClean="0">
+                <a:hlinkClick r:id="rId2"/>
+              </a:rPr>
+              <a:t>github.com/STEllAR-GROUP/tutorials/blob/master/examples/00_hello_world/hello_world.cpp</a:t>
+            </a:r>
+            <a:endParaRPr lang="en-US" dirty="0" smtClean="0"/>
+          </a:p>
+          <a:p>
+            <a:endParaRPr lang="en-US" dirty="0"/>
+          </a:p>
+        </p:txBody>
+      </p:sp>
+      <p:sp>
+        <p:nvSpPr>
+          <p:cNvPr id="4" name="Date Placeholder 3"/>
+          <p:cNvSpPr>
+            <a:spLocks noGrp="1"/>
+          </p:cNvSpPr>
+          <p:nvPr>
+            <p:ph type="dt" sz="half" idx="10"/>
+          </p:nvPr>
+        </p:nvSpPr>
+        <p:spPr/>
+        <p:txBody>
+          <a:bodyPr/>
+          <a:lstStyle/>
+          <a:p>
+            <a:r>
+              <a:rPr lang="en-US" smtClean="0"/>
+              <a:t>10/18/2016</a:t>
+            </a:r>
+            <a:endParaRPr lang="en-US"/>
+          </a:p>
+        </p:txBody>
+      </p:sp>
+      <p:sp>
+        <p:nvSpPr>
+          <p:cNvPr id="5" name="Footer Placeholder 4"/>
+          <p:cNvSpPr>
+            <a:spLocks noGrp="1"/>
+          </p:cNvSpPr>
+          <p:nvPr>
+            <p:ph type="ftr" sz="quarter" idx="11"/>
+          </p:nvPr>
+        </p:nvSpPr>
+        <p:spPr/>
+        <p:txBody>
+          <a:bodyPr/>
+          <a:lstStyle/>
+          <a:p>
+            <a:r>
+              <a:rPr lang="en-US" smtClean="0"/>
+              <a:t>HPX Workshop (Berkeley C++ Summit) - 1,            Hartmut Kaiser (hkaiser@cct.lsu.edu)</a:t>
+            </a:r>
+            <a:endParaRPr lang="en-US"/>
+          </a:p>
+        </p:txBody>
+      </p:sp>
+      <p:sp>
+        <p:nvSpPr>
+          <p:cNvPr id="6" name="Slide Number Placeholder 5"/>
+          <p:cNvSpPr>
+            <a:spLocks noGrp="1"/>
+          </p:cNvSpPr>
+          <p:nvPr>
+            <p:ph type="sldNum" sz="quarter" idx="12"/>
+          </p:nvPr>
+        </p:nvSpPr>
+        <p:spPr/>
+        <p:txBody>
+          <a:bodyPr>
+            <a:normAutofit lnSpcReduction="10000"/>
+          </a:bodyPr>
+          <a:lstStyle/>
+          <a:p>
+            <a:fld id="{B102E578-8C1A-4150-8490-48A08D76AC22}" type="slidenum">
+              <a:rPr lang="en-US" smtClean="0"/>
+              <a:t>34</a:t>
+            </a:fld>
+            <a:endParaRPr lang="en-US"/>
+          </a:p>
+        </p:txBody>
+      </p:sp>
+    </p:spTree>
+    <p:extLst>
+      <p:ext uri="{BB962C8B-B14F-4D97-AF65-F5344CB8AC3E}">
+        <p14:creationId xmlns:p14="http://schemas.microsoft.com/office/powerpoint/2010/main" val="1750137333"/>
+      </p:ext>
+    </p:extLst>
+  </p:cSld>
+  <p:clrMapOvr>
+    <a:masterClrMapping/>
+  </p:clrMapOvr>
+  <p:timing>
+    <p:tnLst>
+      <p:par>
+        <p:cTn id="1" dur="indefinite" restart="never" nodeType="tmRoot"/>
+      </p:par>
+    </p:tnLst>
+  </p:timing>
+</p:sld>
+</file>
+
+<file path=ppt/slides/slide35.xml><?xml version="1.0" encoding="utf-8"?>
 <p:sld xmlns:a="http://schemas.openxmlformats.org/drawingml/2006/main" xmlns:r="http://schemas.openxmlformats.org/officeDocument/2006/relationships" xmlns:p="http://schemas.openxmlformats.org/presentationml/2006/main">
   <p:cSld>
     <p:spTree>
@@ -17975,7 +18142,7 @@
           <a:p>
             <a:r>
               <a:rPr lang="en-US" smtClean="0"/>
-              <a:t>HPX - The C++ Standards Library for Concurrency and Parallelism (http://stellar-group.org/hpx)</a:t>
+              <a:t>HPX Workshop (Berkeley C++ Summit) - 1,            Hartmut Kaiser (hkaiser@cct.lsu.edu)</a:t>
             </a:r>
             <a:endParaRPr lang="en-US"/>
           </a:p>
@@ -18000,7 +18167,7 @@
           <a:p>
             <a:fld id="{65339F38-439B-42BE-A6DB-D203DE66964E}" type="slidenum">
               <a:rPr lang="en-US" smtClean="0"/>
-              <a:t>34</a:t>
+              <a:t>35</a:t>
             </a:fld>
             <a:endParaRPr lang="en-US"/>
           </a:p>
@@ -18250,7 +18417,7 @@
           <a:p>
             <a:r>
               <a:rPr lang="en-US" smtClean="0"/>
-              <a:t>HPX - The C++ Standards Library for Concurrency and Parallelism (http://stellar-group.org/hpx)</a:t>
+              <a:t>HPX Workshop (Berkeley C++ Summit) - 1,            Hartmut Kaiser (hkaiser@cct.lsu.edu)</a:t>
             </a:r>
             <a:endParaRPr lang="en-US"/>
           </a:p>
@@ -18651,7 +18818,7 @@
           <a:p>
             <a:r>
               <a:rPr lang="en-US" smtClean="0"/>
-              <a:t>HPX - The C++ Standards Library for Concurrency and Parallelism (http://stellar-group.org/hpx)</a:t>
+              <a:t>HPX Workshop (Berkeley C++ Summit) - 1,            Hartmut Kaiser (hkaiser@cct.lsu.edu)</a:t>
             </a:r>
             <a:endParaRPr lang="en-US"/>
           </a:p>
@@ -18805,7 +18972,7 @@
           <a:p>
             <a:r>
               <a:rPr lang="en-US" smtClean="0"/>
-              <a:t>HPX - The C++ Standards Library for Concurrency and Parallelism (http://stellar-group.org/hpx)</a:t>
+              <a:t>HPX Workshop (Berkeley C++ Summit) - 1,            Hartmut Kaiser (hkaiser@cct.lsu.edu)</a:t>
             </a:r>
             <a:endParaRPr lang="en-US"/>
           </a:p>
@@ -19116,7 +19283,7 @@
           <a:p>
             <a:r>
               <a:rPr lang="en-US" smtClean="0"/>
-              <a:t>HPX - The C++ Standards Library for Concurrency and Parallelism (http://stellar-group.org/hpx)</a:t>
+              <a:t>HPX Workshop (Berkeley C++ Summit) - 1,            Hartmut Kaiser (hkaiser@cct.lsu.edu)</a:t>
             </a:r>
             <a:endParaRPr lang="en-US"/>
           </a:p>
@@ -20312,7 +20479,7 @@
           <a:p>
             <a:r>
               <a:rPr lang="en-US" smtClean="0"/>
-              <a:t>HPX - The C++ Standards Library for Concurrency and Parallelism (http://stellar-group.org/hpx)</a:t>
+              <a:t>HPX Workshop (Berkeley C++ Summit) - 1,            Hartmut Kaiser (hkaiser@cct.lsu.edu)</a:t>
             </a:r>
             <a:endParaRPr lang="en-US"/>
           </a:p>
@@ -21382,7 +21549,7 @@
           <a:p>
             <a:r>
               <a:rPr lang="en-US" smtClean="0"/>
-              <a:t>HPX - The C++ Standards Library for Concurrency and Parallelism (http://stellar-group.org/hpx)</a:t>
+              <a:t>HPX Workshop (Berkeley C++ Summit) - 1,            Hartmut Kaiser (hkaiser@cct.lsu.edu)</a:t>
             </a:r>
             <a:endParaRPr lang="en-US"/>
           </a:p>

</xml_diff>